<commit_message>
Proto persona e Diagrama atualizados
</commit_message>
<xml_diff>
--- a/Documentação/ProtoPersona.pptx
+++ b/Documentação/ProtoPersona.pptx
@@ -7,6 +7,7 @@
   <p:sldIdLst>
     <p:sldId id="256" r:id="rId2"/>
     <p:sldId id="257" r:id="rId3"/>
+    <p:sldId id="258" r:id="rId4"/>
   </p:sldIdLst>
   <p:sldSz cx="12192000" cy="6858000"/>
   <p:notesSz cx="6858000" cy="9144000"/>
@@ -105,6 +106,11 @@
       </a:defRPr>
     </a:lvl9pPr>
   </p:defaultTextStyle>
+  <p:extLst>
+    <p:ext uri="{EFAFB233-063F-42B5-8137-9DF3F51BA10A}">
+      <p15:sldGuideLst xmlns:p15="http://schemas.microsoft.com/office/powerpoint/2012/main"/>
+    </p:ext>
+  </p:extLst>
 </p:presentation>
 </file>
 
@@ -255,7 +261,7 @@
           <a:p>
             <a:fld id="{085FE36A-8CFA-4728-8405-DB8AFA9CB2FE}" type="datetimeFigureOut">
               <a:rPr lang="pt-BR" smtClean="0"/>
-              <a:t>03/09/2020</a:t>
+              <a:t>23/09/2020</a:t>
             </a:fld>
             <a:endParaRPr lang="pt-BR"/>
           </a:p>
@@ -453,7 +459,7 @@
           <a:p>
             <a:fld id="{085FE36A-8CFA-4728-8405-DB8AFA9CB2FE}" type="datetimeFigureOut">
               <a:rPr lang="pt-BR" smtClean="0"/>
-              <a:t>03/09/2020</a:t>
+              <a:t>23/09/2020</a:t>
             </a:fld>
             <a:endParaRPr lang="pt-BR"/>
           </a:p>
@@ -661,7 +667,7 @@
           <a:p>
             <a:fld id="{085FE36A-8CFA-4728-8405-DB8AFA9CB2FE}" type="datetimeFigureOut">
               <a:rPr lang="pt-BR" smtClean="0"/>
-              <a:t>03/09/2020</a:t>
+              <a:t>23/09/2020</a:t>
             </a:fld>
             <a:endParaRPr lang="pt-BR"/>
           </a:p>
@@ -859,7 +865,7 @@
           <a:p>
             <a:fld id="{085FE36A-8CFA-4728-8405-DB8AFA9CB2FE}" type="datetimeFigureOut">
               <a:rPr lang="pt-BR" smtClean="0"/>
-              <a:t>03/09/2020</a:t>
+              <a:t>23/09/2020</a:t>
             </a:fld>
             <a:endParaRPr lang="pt-BR"/>
           </a:p>
@@ -1134,7 +1140,7 @@
           <a:p>
             <a:fld id="{085FE36A-8CFA-4728-8405-DB8AFA9CB2FE}" type="datetimeFigureOut">
               <a:rPr lang="pt-BR" smtClean="0"/>
-              <a:t>03/09/2020</a:t>
+              <a:t>23/09/2020</a:t>
             </a:fld>
             <a:endParaRPr lang="pt-BR"/>
           </a:p>
@@ -1399,7 +1405,7 @@
           <a:p>
             <a:fld id="{085FE36A-8CFA-4728-8405-DB8AFA9CB2FE}" type="datetimeFigureOut">
               <a:rPr lang="pt-BR" smtClean="0"/>
-              <a:t>03/09/2020</a:t>
+              <a:t>23/09/2020</a:t>
             </a:fld>
             <a:endParaRPr lang="pt-BR"/>
           </a:p>
@@ -1811,7 +1817,7 @@
           <a:p>
             <a:fld id="{085FE36A-8CFA-4728-8405-DB8AFA9CB2FE}" type="datetimeFigureOut">
               <a:rPr lang="pt-BR" smtClean="0"/>
-              <a:t>03/09/2020</a:t>
+              <a:t>23/09/2020</a:t>
             </a:fld>
             <a:endParaRPr lang="pt-BR"/>
           </a:p>
@@ -1952,7 +1958,7 @@
           <a:p>
             <a:fld id="{085FE36A-8CFA-4728-8405-DB8AFA9CB2FE}" type="datetimeFigureOut">
               <a:rPr lang="pt-BR" smtClean="0"/>
-              <a:t>03/09/2020</a:t>
+              <a:t>23/09/2020</a:t>
             </a:fld>
             <a:endParaRPr lang="pt-BR"/>
           </a:p>
@@ -2065,7 +2071,7 @@
           <a:p>
             <a:fld id="{085FE36A-8CFA-4728-8405-DB8AFA9CB2FE}" type="datetimeFigureOut">
               <a:rPr lang="pt-BR" smtClean="0"/>
-              <a:t>03/09/2020</a:t>
+              <a:t>23/09/2020</a:t>
             </a:fld>
             <a:endParaRPr lang="pt-BR"/>
           </a:p>
@@ -2376,7 +2382,7 @@
           <a:p>
             <a:fld id="{085FE36A-8CFA-4728-8405-DB8AFA9CB2FE}" type="datetimeFigureOut">
               <a:rPr lang="pt-BR" smtClean="0"/>
-              <a:t>03/09/2020</a:t>
+              <a:t>23/09/2020</a:t>
             </a:fld>
             <a:endParaRPr lang="pt-BR"/>
           </a:p>
@@ -2664,7 +2670,7 @@
           <a:p>
             <a:fld id="{085FE36A-8CFA-4728-8405-DB8AFA9CB2FE}" type="datetimeFigureOut">
               <a:rPr lang="pt-BR" smtClean="0"/>
-              <a:t>03/09/2020</a:t>
+              <a:t>23/09/2020</a:t>
             </a:fld>
             <a:endParaRPr lang="pt-BR"/>
           </a:p>
@@ -2905,7 +2911,7 @@
           <a:p>
             <a:fld id="{085FE36A-8CFA-4728-8405-DB8AFA9CB2FE}" type="datetimeFigureOut">
               <a:rPr lang="pt-BR" smtClean="0"/>
-              <a:t>03/09/2020</a:t>
+              <a:t>23/09/2020</a:t>
             </a:fld>
             <a:endParaRPr lang="pt-BR"/>
           </a:p>
@@ -3599,11 +3605,19 @@
           <a:lstStyle/>
           <a:p>
             <a:r>
-              <a:rPr lang="pt-BR" b="1" dirty="0"/>
+              <a:rPr lang="pt-BR" b="1" dirty="0">
+                <a:solidFill>
+                  <a:srgbClr val="FF0000"/>
+                </a:solidFill>
+              </a:rPr>
               <a:t>Quem</a:t>
             </a:r>
             <a:r>
-              <a:rPr lang="pt-BR" dirty="0"/>
+              <a:rPr lang="pt-BR" dirty="0">
+                <a:solidFill>
+                  <a:srgbClr val="FF0000"/>
+                </a:solidFill>
+              </a:rPr>
               <a:t>?</a:t>
             </a:r>
           </a:p>
@@ -3638,7 +3652,11 @@
           <a:lstStyle/>
           <a:p>
             <a:r>
-              <a:rPr lang="pt-BR" b="1" dirty="0"/>
+              <a:rPr lang="pt-BR" b="1" dirty="0">
+                <a:solidFill>
+                  <a:srgbClr val="FF0000"/>
+                </a:solidFill>
+              </a:rPr>
               <a:t>Informações/Comportamentos</a:t>
             </a:r>
           </a:p>
@@ -3673,7 +3691,11 @@
           <a:lstStyle/>
           <a:p>
             <a:r>
-              <a:rPr lang="pt-BR" b="1" dirty="0"/>
+              <a:rPr lang="pt-BR" b="1" dirty="0">
+                <a:solidFill>
+                  <a:srgbClr val="FF0000"/>
+                </a:solidFill>
+              </a:rPr>
               <a:t>Dores e Necessidades</a:t>
             </a:r>
           </a:p>
@@ -3820,7 +3842,7 @@
         <p:spPr>
           <a:xfrm>
             <a:off x="569843" y="4121426"/>
-            <a:ext cx="5526157" cy="1569660"/>
+            <a:ext cx="5526157" cy="1815882"/>
           </a:xfrm>
           <a:prstGeom prst="rect">
             <a:avLst/>
@@ -3887,7 +3909,20 @@
               <a:buFont typeface="Arial" panose="020B0604020202020204" pitchFamily="34" charset="0"/>
               <a:buChar char="•"/>
             </a:pPr>
-            <a:endParaRPr lang="pt-BR" sz="1600" dirty="0"/>
+            <a:r>
+              <a:rPr lang="pt-BR" sz="1600" dirty="0"/>
+              <a:t>Pressão por metas</a:t>
+            </a:r>
+          </a:p>
+          <a:p>
+            <a:pPr marL="285750" indent="-285750">
+              <a:buFont typeface="Arial" panose="020B0604020202020204" pitchFamily="34" charset="0"/>
+              <a:buChar char="•"/>
+            </a:pPr>
+            <a:r>
+              <a:rPr lang="pt-BR" sz="1600" dirty="0"/>
+              <a:t>Saber o tempo que o funcionário esteve logado</a:t>
+            </a:r>
           </a:p>
         </p:txBody>
       </p:sp>
@@ -3920,8 +3955,8 @@
         </p:blipFill>
         <p:spPr bwMode="auto">
           <a:xfrm>
-            <a:off x="848139" y="1173128"/>
-            <a:ext cx="2292625" cy="1719469"/>
+            <a:off x="663929" y="839857"/>
+            <a:ext cx="2690189" cy="2017642"/>
           </a:xfrm>
           <a:prstGeom prst="rect">
             <a:avLst/>
@@ -3952,7 +3987,7 @@
         </p:nvSpPr>
         <p:spPr>
           <a:xfrm>
-            <a:off x="3538328" y="1173128"/>
+            <a:off x="3790781" y="797749"/>
             <a:ext cx="1868556" cy="369332"/>
           </a:xfrm>
           <a:prstGeom prst="rect">
@@ -3967,7 +4002,15 @@
           <a:lstStyle/>
           <a:p>
             <a:r>
-              <a:rPr lang="pt-BR" dirty="0"/>
+              <a:rPr lang="pt-BR" dirty="0">
+                <a:effectLst>
+                  <a:outerShdw blurRad="38100" dist="38100" dir="2700000" algn="tl">
+                    <a:srgbClr val="000000">
+                      <a:alpha val="43137"/>
+                    </a:srgbClr>
+                  </a:outerShdw>
+                </a:effectLst>
+              </a:rPr>
               <a:t>Vitória</a:t>
             </a:r>
           </a:p>
@@ -3977,6 +4020,566 @@
     <p:extLst>
       <p:ext uri="{BB962C8B-B14F-4D97-AF65-F5344CB8AC3E}">
         <p14:creationId xmlns:p14="http://schemas.microsoft.com/office/powerpoint/2010/main" val="2672387058"/>
+      </p:ext>
+    </p:extLst>
+  </p:cSld>
+  <p:clrMapOvr>
+    <a:masterClrMapping/>
+  </p:clrMapOvr>
+</p:sld>
+</file>
+
+<file path=ppt/slides/slide3.xml><?xml version="1.0" encoding="utf-8"?>
+<p:sld xmlns:a="http://schemas.openxmlformats.org/drawingml/2006/main" xmlns:r="http://schemas.openxmlformats.org/officeDocument/2006/relationships" xmlns:p="http://schemas.openxmlformats.org/presentationml/2006/main">
+  <p:cSld>
+    <p:spTree>
+      <p:nvGrpSpPr>
+        <p:cNvPr id="1" name=""/>
+        <p:cNvGrpSpPr/>
+        <p:nvPr/>
+      </p:nvGrpSpPr>
+      <p:grpSpPr>
+        <a:xfrm>
+          <a:off x="0" y="0"/>
+          <a:ext cx="0" cy="0"/>
+          <a:chOff x="0" y="0"/>
+          <a:chExt cx="0" cy="0"/>
+        </a:xfrm>
+      </p:grpSpPr>
+      <p:sp>
+        <p:nvSpPr>
+          <p:cNvPr id="4" name="Retângulo 3">
+            <a:extLst>
+              <a:ext uri="{FF2B5EF4-FFF2-40B4-BE49-F238E27FC236}">
+                <a16:creationId xmlns:a16="http://schemas.microsoft.com/office/drawing/2014/main" id="{BFDD9954-C0C4-49CA-AF04-ECC4B8335F19}"/>
+              </a:ext>
+            </a:extLst>
+          </p:cNvPr>
+          <p:cNvSpPr/>
+          <p:nvPr/>
+        </p:nvSpPr>
+        <p:spPr>
+          <a:xfrm>
+            <a:off x="450575" y="384313"/>
+            <a:ext cx="5645425" cy="2928730"/>
+          </a:xfrm>
+          <a:prstGeom prst="rect">
+            <a:avLst/>
+          </a:prstGeom>
+        </p:spPr>
+        <p:style>
+          <a:lnRef idx="2">
+            <a:schemeClr val="dk1"/>
+          </a:lnRef>
+          <a:fillRef idx="1">
+            <a:schemeClr val="lt1"/>
+          </a:fillRef>
+          <a:effectRef idx="0">
+            <a:schemeClr val="dk1"/>
+          </a:effectRef>
+          <a:fontRef idx="minor">
+            <a:schemeClr val="dk1"/>
+          </a:fontRef>
+        </p:style>
+        <p:txBody>
+          <a:bodyPr rtlCol="0" anchor="ctr"/>
+          <a:lstStyle/>
+          <a:p>
+            <a:pPr algn="ctr"/>
+            <a:endParaRPr lang="pt-BR" dirty="0"/>
+          </a:p>
+        </p:txBody>
+      </p:sp>
+      <p:sp>
+        <p:nvSpPr>
+          <p:cNvPr id="7" name="Retângulo 6">
+            <a:extLst>
+              <a:ext uri="{FF2B5EF4-FFF2-40B4-BE49-F238E27FC236}">
+                <a16:creationId xmlns:a16="http://schemas.microsoft.com/office/drawing/2014/main" id="{2D132D38-C39F-4C28-A6CA-C06E7D315F3F}"/>
+              </a:ext>
+            </a:extLst>
+          </p:cNvPr>
+          <p:cNvSpPr/>
+          <p:nvPr/>
+        </p:nvSpPr>
+        <p:spPr>
+          <a:xfrm>
+            <a:off x="6215270" y="384313"/>
+            <a:ext cx="5181599" cy="2928730"/>
+          </a:xfrm>
+          <a:prstGeom prst="rect">
+            <a:avLst/>
+          </a:prstGeom>
+        </p:spPr>
+        <p:style>
+          <a:lnRef idx="2">
+            <a:schemeClr val="dk1"/>
+          </a:lnRef>
+          <a:fillRef idx="1">
+            <a:schemeClr val="lt1"/>
+          </a:fillRef>
+          <a:effectRef idx="0">
+            <a:schemeClr val="dk1"/>
+          </a:effectRef>
+          <a:fontRef idx="minor">
+            <a:schemeClr val="dk1"/>
+          </a:fontRef>
+        </p:style>
+        <p:txBody>
+          <a:bodyPr rtlCol="0" anchor="ctr"/>
+          <a:lstStyle/>
+          <a:p>
+            <a:pPr algn="ctr"/>
+            <a:endParaRPr lang="pt-BR"/>
+          </a:p>
+        </p:txBody>
+      </p:sp>
+      <p:sp>
+        <p:nvSpPr>
+          <p:cNvPr id="9" name="Retângulo 8">
+            <a:extLst>
+              <a:ext uri="{FF2B5EF4-FFF2-40B4-BE49-F238E27FC236}">
+                <a16:creationId xmlns:a16="http://schemas.microsoft.com/office/drawing/2014/main" id="{4AA509C1-B8A9-40F2-A5A5-6D32CA93FD8E}"/>
+              </a:ext>
+            </a:extLst>
+          </p:cNvPr>
+          <p:cNvSpPr/>
+          <p:nvPr/>
+        </p:nvSpPr>
+        <p:spPr>
+          <a:xfrm>
+            <a:off x="450574" y="3544957"/>
+            <a:ext cx="10946295" cy="2928730"/>
+          </a:xfrm>
+          <a:prstGeom prst="rect">
+            <a:avLst/>
+          </a:prstGeom>
+        </p:spPr>
+        <p:style>
+          <a:lnRef idx="2">
+            <a:schemeClr val="dk1"/>
+          </a:lnRef>
+          <a:fillRef idx="1">
+            <a:schemeClr val="lt1"/>
+          </a:fillRef>
+          <a:effectRef idx="0">
+            <a:schemeClr val="dk1"/>
+          </a:effectRef>
+          <a:fontRef idx="minor">
+            <a:schemeClr val="dk1"/>
+          </a:fontRef>
+        </p:style>
+        <p:txBody>
+          <a:bodyPr rtlCol="0" anchor="ctr"/>
+          <a:lstStyle/>
+          <a:p>
+            <a:pPr algn="ctr"/>
+            <a:endParaRPr lang="pt-BR"/>
+          </a:p>
+        </p:txBody>
+      </p:sp>
+      <p:sp>
+        <p:nvSpPr>
+          <p:cNvPr id="10" name="CaixaDeTexto 9">
+            <a:extLst>
+              <a:ext uri="{FF2B5EF4-FFF2-40B4-BE49-F238E27FC236}">
+                <a16:creationId xmlns:a16="http://schemas.microsoft.com/office/drawing/2014/main" id="{9A3A5051-DD35-4E3B-9B2B-B19E790FA9C7}"/>
+              </a:ext>
+            </a:extLst>
+          </p:cNvPr>
+          <p:cNvSpPr txBox="1"/>
+          <p:nvPr/>
+        </p:nvSpPr>
+        <p:spPr>
+          <a:xfrm>
+            <a:off x="450574" y="384313"/>
+            <a:ext cx="1431234" cy="369332"/>
+          </a:xfrm>
+          <a:prstGeom prst="rect">
+            <a:avLst/>
+          </a:prstGeom>
+          <a:noFill/>
+        </p:spPr>
+        <p:txBody>
+          <a:bodyPr wrap="square" rtlCol="0">
+            <a:spAutoFit/>
+          </a:bodyPr>
+          <a:lstStyle/>
+          <a:p>
+            <a:r>
+              <a:rPr lang="pt-BR" b="1" dirty="0">
+                <a:solidFill>
+                  <a:srgbClr val="FF0000"/>
+                </a:solidFill>
+              </a:rPr>
+              <a:t>Quem</a:t>
+            </a:r>
+            <a:r>
+              <a:rPr lang="pt-BR" dirty="0">
+                <a:solidFill>
+                  <a:srgbClr val="FF0000"/>
+                </a:solidFill>
+              </a:rPr>
+              <a:t>?</a:t>
+            </a:r>
+          </a:p>
+        </p:txBody>
+      </p:sp>
+      <p:sp>
+        <p:nvSpPr>
+          <p:cNvPr id="12" name="CaixaDeTexto 11">
+            <a:extLst>
+              <a:ext uri="{FF2B5EF4-FFF2-40B4-BE49-F238E27FC236}">
+                <a16:creationId xmlns:a16="http://schemas.microsoft.com/office/drawing/2014/main" id="{505A32BB-55B0-473F-9213-A921B615257B}"/>
+              </a:ext>
+            </a:extLst>
+          </p:cNvPr>
+          <p:cNvSpPr txBox="1"/>
+          <p:nvPr/>
+        </p:nvSpPr>
+        <p:spPr>
+          <a:xfrm>
+            <a:off x="6215270" y="384313"/>
+            <a:ext cx="3233530" cy="369332"/>
+          </a:xfrm>
+          <a:prstGeom prst="rect">
+            <a:avLst/>
+          </a:prstGeom>
+          <a:noFill/>
+        </p:spPr>
+        <p:txBody>
+          <a:bodyPr wrap="square" rtlCol="0">
+            <a:spAutoFit/>
+          </a:bodyPr>
+          <a:lstStyle/>
+          <a:p>
+            <a:r>
+              <a:rPr lang="pt-BR" b="1" dirty="0">
+                <a:solidFill>
+                  <a:srgbClr val="FF0000"/>
+                </a:solidFill>
+              </a:rPr>
+              <a:t>Informações/Comportamentos</a:t>
+            </a:r>
+          </a:p>
+        </p:txBody>
+      </p:sp>
+      <p:sp>
+        <p:nvSpPr>
+          <p:cNvPr id="14" name="CaixaDeTexto 13">
+            <a:extLst>
+              <a:ext uri="{FF2B5EF4-FFF2-40B4-BE49-F238E27FC236}">
+                <a16:creationId xmlns:a16="http://schemas.microsoft.com/office/drawing/2014/main" id="{E33371A8-9687-4637-81D6-8A1212DDFB74}"/>
+              </a:ext>
+            </a:extLst>
+          </p:cNvPr>
+          <p:cNvSpPr txBox="1"/>
+          <p:nvPr/>
+        </p:nvSpPr>
+        <p:spPr>
+          <a:xfrm>
+            <a:off x="450574" y="3544957"/>
+            <a:ext cx="3233530" cy="369332"/>
+          </a:xfrm>
+          <a:prstGeom prst="rect">
+            <a:avLst/>
+          </a:prstGeom>
+          <a:noFill/>
+        </p:spPr>
+        <p:txBody>
+          <a:bodyPr wrap="square" rtlCol="0">
+            <a:spAutoFit/>
+          </a:bodyPr>
+          <a:lstStyle/>
+          <a:p>
+            <a:r>
+              <a:rPr lang="pt-BR" b="1" dirty="0">
+                <a:solidFill>
+                  <a:srgbClr val="FF0000"/>
+                </a:solidFill>
+              </a:rPr>
+              <a:t>Dores e Necessidades</a:t>
+            </a:r>
+          </a:p>
+        </p:txBody>
+      </p:sp>
+      <p:sp>
+        <p:nvSpPr>
+          <p:cNvPr id="15" name="CaixaDeTexto 14">
+            <a:extLst>
+              <a:ext uri="{FF2B5EF4-FFF2-40B4-BE49-F238E27FC236}">
+                <a16:creationId xmlns:a16="http://schemas.microsoft.com/office/drawing/2014/main" id="{A099D833-3EFC-4F34-A47A-AA3D1F5AE7E6}"/>
+              </a:ext>
+            </a:extLst>
+          </p:cNvPr>
+          <p:cNvSpPr txBox="1"/>
+          <p:nvPr/>
+        </p:nvSpPr>
+        <p:spPr>
+          <a:xfrm>
+            <a:off x="6387548" y="1046922"/>
+            <a:ext cx="4439478" cy="338554"/>
+          </a:xfrm>
+          <a:prstGeom prst="rect">
+            <a:avLst/>
+          </a:prstGeom>
+          <a:noFill/>
+        </p:spPr>
+        <p:txBody>
+          <a:bodyPr wrap="square" rtlCol="0">
+            <a:spAutoFit/>
+          </a:bodyPr>
+          <a:lstStyle/>
+          <a:p>
+            <a:pPr marL="285750" indent="-285750">
+              <a:buFont typeface="Arial" panose="020B0604020202020204" pitchFamily="34" charset="0"/>
+              <a:buChar char="•"/>
+            </a:pPr>
+            <a:endParaRPr lang="pt-BR" sz="1600" dirty="0"/>
+          </a:p>
+        </p:txBody>
+      </p:sp>
+      <p:sp>
+        <p:nvSpPr>
+          <p:cNvPr id="16" name="CaixaDeTexto 15">
+            <a:extLst>
+              <a:ext uri="{FF2B5EF4-FFF2-40B4-BE49-F238E27FC236}">
+                <a16:creationId xmlns:a16="http://schemas.microsoft.com/office/drawing/2014/main" id="{10E82B2B-5EE3-4348-813B-B4EFA9F30CDF}"/>
+              </a:ext>
+            </a:extLst>
+          </p:cNvPr>
+          <p:cNvSpPr txBox="1"/>
+          <p:nvPr/>
+        </p:nvSpPr>
+        <p:spPr>
+          <a:xfrm>
+            <a:off x="6387548" y="1046922"/>
+            <a:ext cx="4678017" cy="1569660"/>
+          </a:xfrm>
+          <a:prstGeom prst="rect">
+            <a:avLst/>
+          </a:prstGeom>
+          <a:noFill/>
+        </p:spPr>
+        <p:txBody>
+          <a:bodyPr wrap="square" rtlCol="0">
+            <a:spAutoFit/>
+          </a:bodyPr>
+          <a:lstStyle/>
+          <a:p>
+            <a:pPr marL="285750" indent="-285750">
+              <a:buFont typeface="Arial" panose="020B0604020202020204" pitchFamily="34" charset="0"/>
+              <a:buChar char="•"/>
+            </a:pPr>
+            <a:r>
+              <a:rPr lang="pt-BR" sz="1600" dirty="0"/>
+              <a:t>Trabalha com </a:t>
+            </a:r>
+            <a:r>
+              <a:rPr lang="pt-BR" sz="1600" dirty="0" err="1"/>
+              <a:t>HelpDesk</a:t>
+            </a:r>
+            <a:endParaRPr lang="pt-BR" sz="1600" dirty="0"/>
+          </a:p>
+          <a:p>
+            <a:pPr marL="285750" indent="-285750">
+              <a:buFont typeface="Arial" panose="020B0604020202020204" pitchFamily="34" charset="0"/>
+              <a:buChar char="•"/>
+            </a:pPr>
+            <a:r>
+              <a:rPr lang="pt-BR" sz="1600" dirty="0"/>
+              <a:t>Efetua manutenção nos computadores</a:t>
+            </a:r>
+          </a:p>
+          <a:p>
+            <a:pPr marL="285750" indent="-285750">
+              <a:buFont typeface="Arial" panose="020B0604020202020204" pitchFamily="34" charset="0"/>
+              <a:buChar char="•"/>
+            </a:pPr>
+            <a:r>
+              <a:rPr lang="pt-BR" sz="1600" dirty="0"/>
+              <a:t>Recebe chamados</a:t>
+            </a:r>
+          </a:p>
+          <a:p>
+            <a:pPr marL="285750" indent="-285750">
+              <a:buFont typeface="Arial" panose="020B0604020202020204" pitchFamily="34" charset="0"/>
+              <a:buChar char="•"/>
+            </a:pPr>
+            <a:r>
+              <a:rPr lang="pt-BR" sz="1600" dirty="0"/>
+              <a:t>Preparam as máquinas para os funcionários</a:t>
+            </a:r>
+          </a:p>
+          <a:p>
+            <a:pPr marL="285750" indent="-285750">
+              <a:buFont typeface="Arial" panose="020B0604020202020204" pitchFamily="34" charset="0"/>
+              <a:buChar char="•"/>
+            </a:pPr>
+            <a:endParaRPr lang="pt-BR" sz="1600" dirty="0"/>
+          </a:p>
+          <a:p>
+            <a:pPr marL="285750" indent="-285750">
+              <a:buFont typeface="Arial" panose="020B0604020202020204" pitchFamily="34" charset="0"/>
+              <a:buChar char="•"/>
+            </a:pPr>
+            <a:endParaRPr lang="pt-BR" sz="1600" dirty="0"/>
+          </a:p>
+        </p:txBody>
+      </p:sp>
+      <p:sp>
+        <p:nvSpPr>
+          <p:cNvPr id="17" name="CaixaDeTexto 16">
+            <a:extLst>
+              <a:ext uri="{FF2B5EF4-FFF2-40B4-BE49-F238E27FC236}">
+                <a16:creationId xmlns:a16="http://schemas.microsoft.com/office/drawing/2014/main" id="{FDF12252-FBEE-4671-B58C-54DDB5500FA7}"/>
+              </a:ext>
+            </a:extLst>
+          </p:cNvPr>
+          <p:cNvSpPr txBox="1"/>
+          <p:nvPr/>
+        </p:nvSpPr>
+        <p:spPr>
+          <a:xfrm>
+            <a:off x="510208" y="4121157"/>
+            <a:ext cx="5526157" cy="1323439"/>
+          </a:xfrm>
+          <a:prstGeom prst="rect">
+            <a:avLst/>
+          </a:prstGeom>
+          <a:noFill/>
+        </p:spPr>
+        <p:txBody>
+          <a:bodyPr wrap="square" rtlCol="0">
+            <a:spAutoFit/>
+          </a:bodyPr>
+          <a:lstStyle/>
+          <a:p>
+            <a:pPr marL="285750" indent="-285750">
+              <a:buFont typeface="Arial" panose="020B0604020202020204" pitchFamily="34" charset="0"/>
+              <a:buChar char="•"/>
+            </a:pPr>
+            <a:r>
+              <a:rPr lang="pt-BR" sz="1600" dirty="0"/>
+              <a:t>Falta de agilidade na comunicação</a:t>
+            </a:r>
+          </a:p>
+          <a:p>
+            <a:pPr marL="285750" indent="-285750">
+              <a:buFont typeface="Arial" panose="020B0604020202020204" pitchFamily="34" charset="0"/>
+              <a:buChar char="•"/>
+            </a:pPr>
+            <a:r>
+              <a:rPr lang="pt-BR" sz="1600" dirty="0"/>
+              <a:t>Alta demanda</a:t>
+            </a:r>
+          </a:p>
+          <a:p>
+            <a:pPr marL="285750" indent="-285750">
+              <a:buFont typeface="Arial" panose="020B0604020202020204" pitchFamily="34" charset="0"/>
+              <a:buChar char="•"/>
+            </a:pPr>
+            <a:r>
+              <a:rPr lang="pt-BR" sz="1600" dirty="0"/>
+              <a:t>Tempo de atendimento alto</a:t>
+            </a:r>
+          </a:p>
+          <a:p>
+            <a:pPr marL="285750" indent="-285750">
+              <a:buFont typeface="Arial" panose="020B0604020202020204" pitchFamily="34" charset="0"/>
+              <a:buChar char="•"/>
+            </a:pPr>
+            <a:r>
+              <a:rPr lang="pt-BR" sz="1600" dirty="0"/>
+              <a:t>Pressão para soluções rápidas</a:t>
+            </a:r>
+          </a:p>
+          <a:p>
+            <a:pPr marL="285750" indent="-285750">
+              <a:buFont typeface="Arial" panose="020B0604020202020204" pitchFamily="34" charset="0"/>
+              <a:buChar char="•"/>
+            </a:pPr>
+            <a:endParaRPr lang="pt-BR" sz="1600" dirty="0"/>
+          </a:p>
+        </p:txBody>
+      </p:sp>
+      <p:pic>
+        <p:nvPicPr>
+          <p:cNvPr id="3" name="Imagem 2">
+            <a:extLst>
+              <a:ext uri="{FF2B5EF4-FFF2-40B4-BE49-F238E27FC236}">
+                <a16:creationId xmlns:a16="http://schemas.microsoft.com/office/drawing/2014/main" id="{11A26AE2-6A38-4957-8DB2-DF3FED45642C}"/>
+              </a:ext>
+            </a:extLst>
+          </p:cNvPr>
+          <p:cNvPicPr>
+            <a:picLocks noChangeAspect="1"/>
+          </p:cNvPicPr>
+          <p:nvPr/>
+        </p:nvPicPr>
+        <p:blipFill>
+          <a:blip r:embed="rId2"/>
+          <a:stretch>
+            <a:fillRect/>
+          </a:stretch>
+        </p:blipFill>
+        <p:spPr>
+          <a:xfrm>
+            <a:off x="815637" y="960513"/>
+            <a:ext cx="2903478" cy="2033446"/>
+          </a:xfrm>
+          <a:prstGeom prst="rect">
+            <a:avLst/>
+          </a:prstGeom>
+        </p:spPr>
+      </p:pic>
+      <p:sp>
+        <p:nvSpPr>
+          <p:cNvPr id="5" name="CaixaDeTexto 4">
+            <a:extLst>
+              <a:ext uri="{FF2B5EF4-FFF2-40B4-BE49-F238E27FC236}">
+                <a16:creationId xmlns:a16="http://schemas.microsoft.com/office/drawing/2014/main" id="{054D7B99-8434-493B-BA18-D246C9849050}"/>
+              </a:ext>
+            </a:extLst>
+          </p:cNvPr>
+          <p:cNvSpPr txBox="1"/>
+          <p:nvPr/>
+        </p:nvSpPr>
+        <p:spPr>
+          <a:xfrm>
+            <a:off x="4005627" y="960513"/>
+            <a:ext cx="1039091" cy="369332"/>
+          </a:xfrm>
+          <a:prstGeom prst="rect">
+            <a:avLst/>
+          </a:prstGeom>
+          <a:noFill/>
+        </p:spPr>
+        <p:txBody>
+          <a:bodyPr wrap="square" rtlCol="0">
+            <a:spAutoFit/>
+          </a:bodyPr>
+          <a:lstStyle/>
+          <a:p>
+            <a:r>
+              <a:rPr lang="pt-BR" dirty="0">
+                <a:effectLst>
+                  <a:outerShdw blurRad="38100" dist="38100" dir="2700000" algn="tl">
+                    <a:srgbClr val="000000">
+                      <a:alpha val="43137"/>
+                    </a:srgbClr>
+                  </a:outerShdw>
+                </a:effectLst>
+              </a:rPr>
+              <a:t>Marcela</a:t>
+            </a:r>
+          </a:p>
+        </p:txBody>
+      </p:sp>
+    </p:spTree>
+    <p:extLst>
+      <p:ext uri="{BB962C8B-B14F-4D97-AF65-F5344CB8AC3E}">
+        <p14:creationId xmlns:p14="http://schemas.microsoft.com/office/powerpoint/2010/main" val="123687502"/>
       </p:ext>
     </p:extLst>
   </p:cSld>

</xml_diff>

<commit_message>
funcionário adicionado na protopersona
</commit_message>
<xml_diff>
--- a/Documentação/ProtoPersona.pptx
+++ b/Documentação/ProtoPersona.pptx
@@ -7,6 +7,7 @@
   <p:sldIdLst>
     <p:sldId id="256" r:id="rId2"/>
     <p:sldId id="257" r:id="rId3"/>
+    <p:sldId id="259" r:id="rId4"/>
   </p:sldIdLst>
   <p:sldSz cx="12192000" cy="6858000"/>
   <p:notesSz cx="6858000" cy="9144000"/>
@@ -113,6 +114,82 @@
 </p:presentation>
 </file>
 
+<file path=ppt/revisionInfo.xml><?xml version="1.0" encoding="utf-8"?>
+<p1510:revInfo xmlns:a="http://schemas.openxmlformats.org/drawingml/2006/main" xmlns:r="http://schemas.openxmlformats.org/officeDocument/2006/relationships" xmlns:p1510="http://schemas.microsoft.com/office/powerpoint/2015/10/main">
+  <p1510:revLst>
+    <p1510:client id="{D8E1ED35-0B6C-4903-B8A9-9FE221782179}" v="6" dt="2020-10-25T20:39:37.070"/>
+  </p1510:revLst>
+</p1510:revInfo>
+</file>
+
+<file path=ppt/changesInfos/changesInfo1.xml><?xml version="1.0" encoding="utf-8"?>
+<pc:chgInfo xmlns:a="http://schemas.openxmlformats.org/drawingml/2006/main" xmlns:r="http://schemas.openxmlformats.org/officeDocument/2006/relationships" xmlns:ac="http://schemas.microsoft.com/office/drawing/2013/main/command" xmlns:pc="http://schemas.microsoft.com/office/powerpoint/2013/main/command">
+  <pc:docChgLst>
+    <pc:chgData name="Gabriel Henrique Lazaro" userId="0b2dcd55d22b698a" providerId="LiveId" clId="{D8E1ED35-0B6C-4903-B8A9-9FE221782179}"/>
+    <pc:docChg chg="addSld delSld modSld">
+      <pc:chgData name="Gabriel Henrique Lazaro" userId="0b2dcd55d22b698a" providerId="LiveId" clId="{D8E1ED35-0B6C-4903-B8A9-9FE221782179}" dt="2020-10-25T20:39:48.040" v="434" actId="1076"/>
+      <pc:docMkLst>
+        <pc:docMk/>
+      </pc:docMkLst>
+      <pc:sldChg chg="new del">
+        <pc:chgData name="Gabriel Henrique Lazaro" userId="0b2dcd55d22b698a" providerId="LiveId" clId="{D8E1ED35-0B6C-4903-B8A9-9FE221782179}" dt="2020-10-25T20:32:16.796" v="2" actId="47"/>
+        <pc:sldMkLst>
+          <pc:docMk/>
+          <pc:sldMk cId="2233670128" sldId="258"/>
+        </pc:sldMkLst>
+      </pc:sldChg>
+      <pc:sldChg chg="addSp delSp modSp add mod">
+        <pc:chgData name="Gabriel Henrique Lazaro" userId="0b2dcd55d22b698a" providerId="LiveId" clId="{D8E1ED35-0B6C-4903-B8A9-9FE221782179}" dt="2020-10-25T20:39:48.040" v="434" actId="1076"/>
+        <pc:sldMkLst>
+          <pc:docMk/>
+          <pc:sldMk cId="706159940" sldId="259"/>
+        </pc:sldMkLst>
+        <pc:spChg chg="mod">
+          <ac:chgData name="Gabriel Henrique Lazaro" userId="0b2dcd55d22b698a" providerId="LiveId" clId="{D8E1ED35-0B6C-4903-B8A9-9FE221782179}" dt="2020-10-25T20:39:48.040" v="434" actId="1076"/>
+          <ac:spMkLst>
+            <pc:docMk/>
+            <pc:sldMk cId="706159940" sldId="259"/>
+            <ac:spMk id="2" creationId="{C7EFEEA0-81DC-4198-9D42-29BD0BAB3B31}"/>
+          </ac:spMkLst>
+        </pc:spChg>
+        <pc:spChg chg="mod">
+          <ac:chgData name="Gabriel Henrique Lazaro" userId="0b2dcd55d22b698a" providerId="LiveId" clId="{D8E1ED35-0B6C-4903-B8A9-9FE221782179}" dt="2020-10-25T20:35:27.910" v="199" actId="20577"/>
+          <ac:spMkLst>
+            <pc:docMk/>
+            <pc:sldMk cId="706159940" sldId="259"/>
+            <ac:spMk id="16" creationId="{10E82B2B-5EE3-4348-813B-B4EFA9F30CDF}"/>
+          </ac:spMkLst>
+        </pc:spChg>
+        <pc:spChg chg="mod">
+          <ac:chgData name="Gabriel Henrique Lazaro" userId="0b2dcd55d22b698a" providerId="LiveId" clId="{D8E1ED35-0B6C-4903-B8A9-9FE221782179}" dt="2020-10-25T20:37:41.210" v="428" actId="20577"/>
+          <ac:spMkLst>
+            <pc:docMk/>
+            <pc:sldMk cId="706159940" sldId="259"/>
+            <ac:spMk id="17" creationId="{FDF12252-FBEE-4671-B58C-54DDB5500FA7}"/>
+          </ac:spMkLst>
+        </pc:spChg>
+        <pc:picChg chg="add mod">
+          <ac:chgData name="Gabriel Henrique Lazaro" userId="0b2dcd55d22b698a" providerId="LiveId" clId="{D8E1ED35-0B6C-4903-B8A9-9FE221782179}" dt="2020-10-25T20:39:37.070" v="433" actId="1076"/>
+          <ac:picMkLst>
+            <pc:docMk/>
+            <pc:sldMk cId="706159940" sldId="259"/>
+            <ac:picMk id="1026" creationId="{904FD47A-DC3C-428D-B8F8-745B125FE6B5}"/>
+          </ac:picMkLst>
+        </pc:picChg>
+        <pc:picChg chg="del">
+          <ac:chgData name="Gabriel Henrique Lazaro" userId="0b2dcd55d22b698a" providerId="LiveId" clId="{D8E1ED35-0B6C-4903-B8A9-9FE221782179}" dt="2020-10-25T20:39:31.770" v="432" actId="478"/>
+          <ac:picMkLst>
+            <pc:docMk/>
+            <pc:sldMk cId="706159940" sldId="259"/>
+            <ac:picMk id="3074" creationId="{D6D37708-1620-4AC0-8990-A92DC0E6E200}"/>
+          </ac:picMkLst>
+        </pc:picChg>
+      </pc:sldChg>
+    </pc:docChg>
+  </pc:docChgLst>
+</pc:chgInfo>
+</file>
+
 <file path=ppt/slideLayouts/slideLayout1.xml><?xml version="1.0" encoding="utf-8"?>
 <p:sldLayout xmlns:a="http://schemas.openxmlformats.org/drawingml/2006/main" xmlns:r="http://schemas.openxmlformats.org/officeDocument/2006/relationships" xmlns:p="http://schemas.openxmlformats.org/presentationml/2006/main" type="title" preserve="1">
   <p:cSld name="Slide de Título">
@@ -260,7 +337,7 @@
           <a:p>
             <a:fld id="{085FE36A-8CFA-4728-8405-DB8AFA9CB2FE}" type="datetimeFigureOut">
               <a:rPr lang="pt-BR" smtClean="0"/>
-              <a:t>21/10/2020</a:t>
+              <a:t>25/10/2020</a:t>
             </a:fld>
             <a:endParaRPr lang="pt-BR"/>
           </a:p>
@@ -458,7 +535,7 @@
           <a:p>
             <a:fld id="{085FE36A-8CFA-4728-8405-DB8AFA9CB2FE}" type="datetimeFigureOut">
               <a:rPr lang="pt-BR" smtClean="0"/>
-              <a:t>21/10/2020</a:t>
+              <a:t>25/10/2020</a:t>
             </a:fld>
             <a:endParaRPr lang="pt-BR"/>
           </a:p>
@@ -666,7 +743,7 @@
           <a:p>
             <a:fld id="{085FE36A-8CFA-4728-8405-DB8AFA9CB2FE}" type="datetimeFigureOut">
               <a:rPr lang="pt-BR" smtClean="0"/>
-              <a:t>21/10/2020</a:t>
+              <a:t>25/10/2020</a:t>
             </a:fld>
             <a:endParaRPr lang="pt-BR"/>
           </a:p>
@@ -864,7 +941,7 @@
           <a:p>
             <a:fld id="{085FE36A-8CFA-4728-8405-DB8AFA9CB2FE}" type="datetimeFigureOut">
               <a:rPr lang="pt-BR" smtClean="0"/>
-              <a:t>21/10/2020</a:t>
+              <a:t>25/10/2020</a:t>
             </a:fld>
             <a:endParaRPr lang="pt-BR"/>
           </a:p>
@@ -1139,7 +1216,7 @@
           <a:p>
             <a:fld id="{085FE36A-8CFA-4728-8405-DB8AFA9CB2FE}" type="datetimeFigureOut">
               <a:rPr lang="pt-BR" smtClean="0"/>
-              <a:t>21/10/2020</a:t>
+              <a:t>25/10/2020</a:t>
             </a:fld>
             <a:endParaRPr lang="pt-BR"/>
           </a:p>
@@ -1404,7 +1481,7 @@
           <a:p>
             <a:fld id="{085FE36A-8CFA-4728-8405-DB8AFA9CB2FE}" type="datetimeFigureOut">
               <a:rPr lang="pt-BR" smtClean="0"/>
-              <a:t>21/10/2020</a:t>
+              <a:t>25/10/2020</a:t>
             </a:fld>
             <a:endParaRPr lang="pt-BR"/>
           </a:p>
@@ -1816,7 +1893,7 @@
           <a:p>
             <a:fld id="{085FE36A-8CFA-4728-8405-DB8AFA9CB2FE}" type="datetimeFigureOut">
               <a:rPr lang="pt-BR" smtClean="0"/>
-              <a:t>21/10/2020</a:t>
+              <a:t>25/10/2020</a:t>
             </a:fld>
             <a:endParaRPr lang="pt-BR"/>
           </a:p>
@@ -1957,7 +2034,7 @@
           <a:p>
             <a:fld id="{085FE36A-8CFA-4728-8405-DB8AFA9CB2FE}" type="datetimeFigureOut">
               <a:rPr lang="pt-BR" smtClean="0"/>
-              <a:t>21/10/2020</a:t>
+              <a:t>25/10/2020</a:t>
             </a:fld>
             <a:endParaRPr lang="pt-BR"/>
           </a:p>
@@ -2070,7 +2147,7 @@
           <a:p>
             <a:fld id="{085FE36A-8CFA-4728-8405-DB8AFA9CB2FE}" type="datetimeFigureOut">
               <a:rPr lang="pt-BR" smtClean="0"/>
-              <a:t>21/10/2020</a:t>
+              <a:t>25/10/2020</a:t>
             </a:fld>
             <a:endParaRPr lang="pt-BR"/>
           </a:p>
@@ -2381,7 +2458,7 @@
           <a:p>
             <a:fld id="{085FE36A-8CFA-4728-8405-DB8AFA9CB2FE}" type="datetimeFigureOut">
               <a:rPr lang="pt-BR" smtClean="0"/>
-              <a:t>21/10/2020</a:t>
+              <a:t>25/10/2020</a:t>
             </a:fld>
             <a:endParaRPr lang="pt-BR"/>
           </a:p>
@@ -2669,7 +2746,7 @@
           <a:p>
             <a:fld id="{085FE36A-8CFA-4728-8405-DB8AFA9CB2FE}" type="datetimeFigureOut">
               <a:rPr lang="pt-BR" smtClean="0"/>
-              <a:t>21/10/2020</a:t>
+              <a:t>25/10/2020</a:t>
             </a:fld>
             <a:endParaRPr lang="pt-BR"/>
           </a:p>
@@ -2910,7 +2987,7 @@
           <a:p>
             <a:fld id="{085FE36A-8CFA-4728-8405-DB8AFA9CB2FE}" type="datetimeFigureOut">
               <a:rPr lang="pt-BR" smtClean="0"/>
-              <a:t>21/10/2020</a:t>
+              <a:t>25/10/2020</a:t>
             </a:fld>
             <a:endParaRPr lang="pt-BR"/>
           </a:p>
@@ -4028,6 +4105,588 @@
 </p:sld>
 </file>
 
+<file path=ppt/slides/slide3.xml><?xml version="1.0" encoding="utf-8"?>
+<p:sld xmlns:a="http://schemas.openxmlformats.org/drawingml/2006/main" xmlns:r="http://schemas.openxmlformats.org/officeDocument/2006/relationships" xmlns:p="http://schemas.openxmlformats.org/presentationml/2006/main">
+  <p:cSld>
+    <p:spTree>
+      <p:nvGrpSpPr>
+        <p:cNvPr id="1" name=""/>
+        <p:cNvGrpSpPr/>
+        <p:nvPr/>
+      </p:nvGrpSpPr>
+      <p:grpSpPr>
+        <a:xfrm>
+          <a:off x="0" y="0"/>
+          <a:ext cx="0" cy="0"/>
+          <a:chOff x="0" y="0"/>
+          <a:chExt cx="0" cy="0"/>
+        </a:xfrm>
+      </p:grpSpPr>
+      <p:sp>
+        <p:nvSpPr>
+          <p:cNvPr id="4" name="Retângulo 3">
+            <a:extLst>
+              <a:ext uri="{FF2B5EF4-FFF2-40B4-BE49-F238E27FC236}">
+                <a16:creationId xmlns:a16="http://schemas.microsoft.com/office/drawing/2014/main" id="{BFDD9954-C0C4-49CA-AF04-ECC4B8335F19}"/>
+              </a:ext>
+            </a:extLst>
+          </p:cNvPr>
+          <p:cNvSpPr/>
+          <p:nvPr/>
+        </p:nvSpPr>
+        <p:spPr>
+          <a:xfrm>
+            <a:off x="450575" y="384313"/>
+            <a:ext cx="5645425" cy="2928730"/>
+          </a:xfrm>
+          <a:prstGeom prst="rect">
+            <a:avLst/>
+          </a:prstGeom>
+        </p:spPr>
+        <p:style>
+          <a:lnRef idx="2">
+            <a:schemeClr val="dk1"/>
+          </a:lnRef>
+          <a:fillRef idx="1">
+            <a:schemeClr val="lt1"/>
+          </a:fillRef>
+          <a:effectRef idx="0">
+            <a:schemeClr val="dk1"/>
+          </a:effectRef>
+          <a:fontRef idx="minor">
+            <a:schemeClr val="dk1"/>
+          </a:fontRef>
+        </p:style>
+        <p:txBody>
+          <a:bodyPr rtlCol="0" anchor="ctr"/>
+          <a:lstStyle/>
+          <a:p>
+            <a:pPr algn="ctr"/>
+            <a:endParaRPr lang="pt-BR" dirty="0"/>
+          </a:p>
+        </p:txBody>
+      </p:sp>
+      <p:sp>
+        <p:nvSpPr>
+          <p:cNvPr id="7" name="Retângulo 6">
+            <a:extLst>
+              <a:ext uri="{FF2B5EF4-FFF2-40B4-BE49-F238E27FC236}">
+                <a16:creationId xmlns:a16="http://schemas.microsoft.com/office/drawing/2014/main" id="{2D132D38-C39F-4C28-A6CA-C06E7D315F3F}"/>
+              </a:ext>
+            </a:extLst>
+          </p:cNvPr>
+          <p:cNvSpPr/>
+          <p:nvPr/>
+        </p:nvSpPr>
+        <p:spPr>
+          <a:xfrm>
+            <a:off x="6215270" y="384313"/>
+            <a:ext cx="5181599" cy="2928730"/>
+          </a:xfrm>
+          <a:prstGeom prst="rect">
+            <a:avLst/>
+          </a:prstGeom>
+        </p:spPr>
+        <p:style>
+          <a:lnRef idx="2">
+            <a:schemeClr val="dk1"/>
+          </a:lnRef>
+          <a:fillRef idx="1">
+            <a:schemeClr val="lt1"/>
+          </a:fillRef>
+          <a:effectRef idx="0">
+            <a:schemeClr val="dk1"/>
+          </a:effectRef>
+          <a:fontRef idx="minor">
+            <a:schemeClr val="dk1"/>
+          </a:fontRef>
+        </p:style>
+        <p:txBody>
+          <a:bodyPr rtlCol="0" anchor="ctr"/>
+          <a:lstStyle/>
+          <a:p>
+            <a:pPr algn="ctr"/>
+            <a:endParaRPr lang="pt-BR"/>
+          </a:p>
+        </p:txBody>
+      </p:sp>
+      <p:sp>
+        <p:nvSpPr>
+          <p:cNvPr id="9" name="Retângulo 8">
+            <a:extLst>
+              <a:ext uri="{FF2B5EF4-FFF2-40B4-BE49-F238E27FC236}">
+                <a16:creationId xmlns:a16="http://schemas.microsoft.com/office/drawing/2014/main" id="{4AA509C1-B8A9-40F2-A5A5-6D32CA93FD8E}"/>
+              </a:ext>
+            </a:extLst>
+          </p:cNvPr>
+          <p:cNvSpPr/>
+          <p:nvPr/>
+        </p:nvSpPr>
+        <p:spPr>
+          <a:xfrm>
+            <a:off x="450574" y="3544957"/>
+            <a:ext cx="10946295" cy="2928730"/>
+          </a:xfrm>
+          <a:prstGeom prst="rect">
+            <a:avLst/>
+          </a:prstGeom>
+        </p:spPr>
+        <p:style>
+          <a:lnRef idx="2">
+            <a:schemeClr val="dk1"/>
+          </a:lnRef>
+          <a:fillRef idx="1">
+            <a:schemeClr val="lt1"/>
+          </a:fillRef>
+          <a:effectRef idx="0">
+            <a:schemeClr val="dk1"/>
+          </a:effectRef>
+          <a:fontRef idx="minor">
+            <a:schemeClr val="dk1"/>
+          </a:fontRef>
+        </p:style>
+        <p:txBody>
+          <a:bodyPr rtlCol="0" anchor="ctr"/>
+          <a:lstStyle/>
+          <a:p>
+            <a:pPr algn="ctr"/>
+            <a:endParaRPr lang="pt-BR"/>
+          </a:p>
+        </p:txBody>
+      </p:sp>
+      <p:sp>
+        <p:nvSpPr>
+          <p:cNvPr id="10" name="CaixaDeTexto 9">
+            <a:extLst>
+              <a:ext uri="{FF2B5EF4-FFF2-40B4-BE49-F238E27FC236}">
+                <a16:creationId xmlns:a16="http://schemas.microsoft.com/office/drawing/2014/main" id="{9A3A5051-DD35-4E3B-9B2B-B19E790FA9C7}"/>
+              </a:ext>
+            </a:extLst>
+          </p:cNvPr>
+          <p:cNvSpPr txBox="1"/>
+          <p:nvPr/>
+        </p:nvSpPr>
+        <p:spPr>
+          <a:xfrm>
+            <a:off x="450574" y="384313"/>
+            <a:ext cx="1431234" cy="369332"/>
+          </a:xfrm>
+          <a:prstGeom prst="rect">
+            <a:avLst/>
+          </a:prstGeom>
+          <a:noFill/>
+        </p:spPr>
+        <p:txBody>
+          <a:bodyPr wrap="square" rtlCol="0">
+            <a:spAutoFit/>
+          </a:bodyPr>
+          <a:lstStyle/>
+          <a:p>
+            <a:r>
+              <a:rPr lang="pt-BR" b="1" dirty="0">
+                <a:solidFill>
+                  <a:srgbClr val="FF0000"/>
+                </a:solidFill>
+              </a:rPr>
+              <a:t>Quem</a:t>
+            </a:r>
+            <a:r>
+              <a:rPr lang="pt-BR" dirty="0">
+                <a:solidFill>
+                  <a:srgbClr val="FF0000"/>
+                </a:solidFill>
+              </a:rPr>
+              <a:t>?</a:t>
+            </a:r>
+          </a:p>
+        </p:txBody>
+      </p:sp>
+      <p:sp>
+        <p:nvSpPr>
+          <p:cNvPr id="12" name="CaixaDeTexto 11">
+            <a:extLst>
+              <a:ext uri="{FF2B5EF4-FFF2-40B4-BE49-F238E27FC236}">
+                <a16:creationId xmlns:a16="http://schemas.microsoft.com/office/drawing/2014/main" id="{505A32BB-55B0-473F-9213-A921B615257B}"/>
+              </a:ext>
+            </a:extLst>
+          </p:cNvPr>
+          <p:cNvSpPr txBox="1"/>
+          <p:nvPr/>
+        </p:nvSpPr>
+        <p:spPr>
+          <a:xfrm>
+            <a:off x="6215270" y="384313"/>
+            <a:ext cx="3233530" cy="369332"/>
+          </a:xfrm>
+          <a:prstGeom prst="rect">
+            <a:avLst/>
+          </a:prstGeom>
+          <a:noFill/>
+        </p:spPr>
+        <p:txBody>
+          <a:bodyPr wrap="square" rtlCol="0">
+            <a:spAutoFit/>
+          </a:bodyPr>
+          <a:lstStyle/>
+          <a:p>
+            <a:r>
+              <a:rPr lang="pt-BR" b="1" dirty="0">
+                <a:solidFill>
+                  <a:srgbClr val="FF0000"/>
+                </a:solidFill>
+              </a:rPr>
+              <a:t>Informações/Comportamentos</a:t>
+            </a:r>
+          </a:p>
+        </p:txBody>
+      </p:sp>
+      <p:sp>
+        <p:nvSpPr>
+          <p:cNvPr id="14" name="CaixaDeTexto 13">
+            <a:extLst>
+              <a:ext uri="{FF2B5EF4-FFF2-40B4-BE49-F238E27FC236}">
+                <a16:creationId xmlns:a16="http://schemas.microsoft.com/office/drawing/2014/main" id="{E33371A8-9687-4637-81D6-8A1212DDFB74}"/>
+              </a:ext>
+            </a:extLst>
+          </p:cNvPr>
+          <p:cNvSpPr txBox="1"/>
+          <p:nvPr/>
+        </p:nvSpPr>
+        <p:spPr>
+          <a:xfrm>
+            <a:off x="450574" y="3544957"/>
+            <a:ext cx="3233530" cy="369332"/>
+          </a:xfrm>
+          <a:prstGeom prst="rect">
+            <a:avLst/>
+          </a:prstGeom>
+          <a:noFill/>
+        </p:spPr>
+        <p:txBody>
+          <a:bodyPr wrap="square" rtlCol="0">
+            <a:spAutoFit/>
+          </a:bodyPr>
+          <a:lstStyle/>
+          <a:p>
+            <a:r>
+              <a:rPr lang="pt-BR" b="1" dirty="0">
+                <a:solidFill>
+                  <a:srgbClr val="FF0000"/>
+                </a:solidFill>
+              </a:rPr>
+              <a:t>Dores e Necessidades</a:t>
+            </a:r>
+          </a:p>
+        </p:txBody>
+      </p:sp>
+      <p:sp>
+        <p:nvSpPr>
+          <p:cNvPr id="15" name="CaixaDeTexto 14">
+            <a:extLst>
+              <a:ext uri="{FF2B5EF4-FFF2-40B4-BE49-F238E27FC236}">
+                <a16:creationId xmlns:a16="http://schemas.microsoft.com/office/drawing/2014/main" id="{A099D833-3EFC-4F34-A47A-AA3D1F5AE7E6}"/>
+              </a:ext>
+            </a:extLst>
+          </p:cNvPr>
+          <p:cNvSpPr txBox="1"/>
+          <p:nvPr/>
+        </p:nvSpPr>
+        <p:spPr>
+          <a:xfrm>
+            <a:off x="6387548" y="1046922"/>
+            <a:ext cx="4439478" cy="338554"/>
+          </a:xfrm>
+          <a:prstGeom prst="rect">
+            <a:avLst/>
+          </a:prstGeom>
+          <a:noFill/>
+        </p:spPr>
+        <p:txBody>
+          <a:bodyPr wrap="square" rtlCol="0">
+            <a:spAutoFit/>
+          </a:bodyPr>
+          <a:lstStyle/>
+          <a:p>
+            <a:pPr marL="285750" indent="-285750">
+              <a:buFont typeface="Arial" panose="020B0604020202020204" pitchFamily="34" charset="0"/>
+              <a:buChar char="•"/>
+            </a:pPr>
+            <a:endParaRPr lang="pt-BR" sz="1600" dirty="0"/>
+          </a:p>
+        </p:txBody>
+      </p:sp>
+      <p:sp>
+        <p:nvSpPr>
+          <p:cNvPr id="16" name="CaixaDeTexto 15">
+            <a:extLst>
+              <a:ext uri="{FF2B5EF4-FFF2-40B4-BE49-F238E27FC236}">
+                <a16:creationId xmlns:a16="http://schemas.microsoft.com/office/drawing/2014/main" id="{10E82B2B-5EE3-4348-813B-B4EFA9F30CDF}"/>
+              </a:ext>
+            </a:extLst>
+          </p:cNvPr>
+          <p:cNvSpPr txBox="1"/>
+          <p:nvPr/>
+        </p:nvSpPr>
+        <p:spPr>
+          <a:xfrm>
+            <a:off x="6387548" y="1046922"/>
+            <a:ext cx="4678017" cy="2062103"/>
+          </a:xfrm>
+          <a:prstGeom prst="rect">
+            <a:avLst/>
+          </a:prstGeom>
+          <a:noFill/>
+        </p:spPr>
+        <p:txBody>
+          <a:bodyPr wrap="square" rtlCol="0">
+            <a:spAutoFit/>
+          </a:bodyPr>
+          <a:lstStyle/>
+          <a:p>
+            <a:pPr marL="285750" indent="-285750">
+              <a:buFont typeface="Arial" panose="020B0604020202020204" pitchFamily="34" charset="0"/>
+              <a:buChar char="•"/>
+            </a:pPr>
+            <a:r>
+              <a:rPr lang="pt-BR" sz="1600" dirty="0"/>
+              <a:t>Operador de telemarketing</a:t>
+            </a:r>
+          </a:p>
+          <a:p>
+            <a:pPr marL="285750" indent="-285750">
+              <a:buFont typeface="Arial" panose="020B0604020202020204" pitchFamily="34" charset="0"/>
+              <a:buChar char="•"/>
+            </a:pPr>
+            <a:r>
+              <a:rPr lang="pt-BR" sz="1600" dirty="0"/>
+              <a:t>Registra as ligações</a:t>
+            </a:r>
+          </a:p>
+          <a:p>
+            <a:pPr marL="285750" indent="-285750">
+              <a:buFont typeface="Arial" panose="020B0604020202020204" pitchFamily="34" charset="0"/>
+              <a:buChar char="•"/>
+            </a:pPr>
+            <a:r>
+              <a:rPr lang="pt-BR" sz="1600" dirty="0"/>
+              <a:t>Utiliza o computador para realizar as operações</a:t>
+            </a:r>
+          </a:p>
+          <a:p>
+            <a:pPr marL="285750" indent="-285750">
+              <a:buFont typeface="Arial" panose="020B0604020202020204" pitchFamily="34" charset="0"/>
+              <a:buChar char="•"/>
+            </a:pPr>
+            <a:r>
+              <a:rPr lang="pt-BR" sz="1600" dirty="0"/>
+              <a:t>Possui muitos parâmetros avaliativos de rendimento</a:t>
+            </a:r>
+          </a:p>
+          <a:p>
+            <a:pPr marL="285750" indent="-285750">
+              <a:buFont typeface="Arial" panose="020B0604020202020204" pitchFamily="34" charset="0"/>
+              <a:buChar char="•"/>
+            </a:pPr>
+            <a:endParaRPr lang="pt-BR" sz="1600" dirty="0"/>
+          </a:p>
+          <a:p>
+            <a:pPr marL="285750" indent="-285750">
+              <a:buFont typeface="Arial" panose="020B0604020202020204" pitchFamily="34" charset="0"/>
+              <a:buChar char="•"/>
+            </a:pPr>
+            <a:endParaRPr lang="pt-BR" sz="1600" dirty="0"/>
+          </a:p>
+          <a:p>
+            <a:pPr marL="285750" indent="-285750">
+              <a:buFont typeface="Arial" panose="020B0604020202020204" pitchFamily="34" charset="0"/>
+              <a:buChar char="•"/>
+            </a:pPr>
+            <a:endParaRPr lang="pt-BR" sz="1600" dirty="0"/>
+          </a:p>
+        </p:txBody>
+      </p:sp>
+      <p:sp>
+        <p:nvSpPr>
+          <p:cNvPr id="17" name="CaixaDeTexto 16">
+            <a:extLst>
+              <a:ext uri="{FF2B5EF4-FFF2-40B4-BE49-F238E27FC236}">
+                <a16:creationId xmlns:a16="http://schemas.microsoft.com/office/drawing/2014/main" id="{FDF12252-FBEE-4671-B58C-54DDB5500FA7}"/>
+              </a:ext>
+            </a:extLst>
+          </p:cNvPr>
+          <p:cNvSpPr txBox="1"/>
+          <p:nvPr/>
+        </p:nvSpPr>
+        <p:spPr>
+          <a:xfrm>
+            <a:off x="569843" y="4121426"/>
+            <a:ext cx="5526157" cy="1323439"/>
+          </a:xfrm>
+          <a:prstGeom prst="rect">
+            <a:avLst/>
+          </a:prstGeom>
+          <a:noFill/>
+        </p:spPr>
+        <p:txBody>
+          <a:bodyPr wrap="square" rtlCol="0">
+            <a:spAutoFit/>
+          </a:bodyPr>
+          <a:lstStyle/>
+          <a:p>
+            <a:pPr marL="285750" indent="-285750">
+              <a:buFont typeface="Arial" panose="020B0604020202020204" pitchFamily="34" charset="0"/>
+              <a:buChar char="•"/>
+            </a:pPr>
+            <a:r>
+              <a:rPr lang="pt-BR" sz="1600" dirty="0"/>
+              <a:t>Saber seu rendimento atual</a:t>
+            </a:r>
+          </a:p>
+          <a:p>
+            <a:pPr marL="285750" indent="-285750">
+              <a:buFont typeface="Arial" panose="020B0604020202020204" pitchFamily="34" charset="0"/>
+              <a:buChar char="•"/>
+            </a:pPr>
+            <a:r>
+              <a:rPr lang="pt-BR" sz="1600" dirty="0"/>
+              <a:t>Informar seu supervisor de lentidões e travamentos</a:t>
+            </a:r>
+          </a:p>
+          <a:p>
+            <a:pPr marL="285750" indent="-285750">
+              <a:buFont typeface="Arial" panose="020B0604020202020204" pitchFamily="34" charset="0"/>
+              <a:buChar char="•"/>
+            </a:pPr>
+            <a:r>
+              <a:rPr lang="pt-BR" sz="1600" dirty="0"/>
+              <a:t>Não desviar o foco do trabalho</a:t>
+            </a:r>
+          </a:p>
+          <a:p>
+            <a:pPr marL="285750" indent="-285750">
+              <a:buFont typeface="Arial" panose="020B0604020202020204" pitchFamily="34" charset="0"/>
+              <a:buChar char="•"/>
+            </a:pPr>
+            <a:r>
+              <a:rPr lang="pt-BR" sz="1600" dirty="0"/>
+              <a:t>Melhorar a eficiência</a:t>
+            </a:r>
+          </a:p>
+          <a:p>
+            <a:pPr marL="285750" indent="-285750">
+              <a:buFont typeface="Arial" panose="020B0604020202020204" pitchFamily="34" charset="0"/>
+              <a:buChar char="•"/>
+            </a:pPr>
+            <a:r>
+              <a:rPr lang="pt-BR" sz="1600" dirty="0"/>
+              <a:t>Registrar pausas, entrada e saída</a:t>
+            </a:r>
+          </a:p>
+        </p:txBody>
+      </p:sp>
+      <p:sp>
+        <p:nvSpPr>
+          <p:cNvPr id="2" name="CaixaDeTexto 1">
+            <a:extLst>
+              <a:ext uri="{FF2B5EF4-FFF2-40B4-BE49-F238E27FC236}">
+                <a16:creationId xmlns:a16="http://schemas.microsoft.com/office/drawing/2014/main" id="{C7EFEEA0-81DC-4198-9D42-29BD0BAB3B31}"/>
+              </a:ext>
+            </a:extLst>
+          </p:cNvPr>
+          <p:cNvSpPr txBox="1"/>
+          <p:nvPr/>
+        </p:nvSpPr>
+        <p:spPr>
+          <a:xfrm>
+            <a:off x="4547153" y="929308"/>
+            <a:ext cx="1868556" cy="369332"/>
+          </a:xfrm>
+          <a:prstGeom prst="rect">
+            <a:avLst/>
+          </a:prstGeom>
+          <a:noFill/>
+        </p:spPr>
+        <p:txBody>
+          <a:bodyPr wrap="square" rtlCol="0">
+            <a:spAutoFit/>
+          </a:bodyPr>
+          <a:lstStyle/>
+          <a:p>
+            <a:r>
+              <a:rPr lang="pt-BR" dirty="0">
+                <a:effectLst>
+                  <a:outerShdw blurRad="38100" dist="38100" dir="2700000" algn="tl">
+                    <a:srgbClr val="000000">
+                      <a:alpha val="43137"/>
+                    </a:srgbClr>
+                  </a:outerShdw>
+                </a:effectLst>
+              </a:rPr>
+              <a:t>Matheus</a:t>
+            </a:r>
+          </a:p>
+        </p:txBody>
+      </p:sp>
+      <p:pic>
+        <p:nvPicPr>
+          <p:cNvPr id="1026" name="Picture 2" descr="Veja as diferenças entre Telemarketing Ativo e Receptivo e como usá-los">
+            <a:extLst>
+              <a:ext uri="{FF2B5EF4-FFF2-40B4-BE49-F238E27FC236}">
+                <a16:creationId xmlns:a16="http://schemas.microsoft.com/office/drawing/2014/main" id="{904FD47A-DC3C-428D-B8F8-745B125FE6B5}"/>
+              </a:ext>
+            </a:extLst>
+          </p:cNvPr>
+          <p:cNvPicPr>
+            <a:picLocks noChangeAspect="1" noChangeArrowheads="1"/>
+          </p:cNvPicPr>
+          <p:nvPr/>
+        </p:nvPicPr>
+        <p:blipFill>
+          <a:blip r:embed="rId2">
+            <a:extLst>
+              <a:ext uri="{28A0092B-C50C-407E-A947-70E740481C1C}">
+                <a14:useLocalDpi xmlns:a14="http://schemas.microsoft.com/office/drawing/2010/main" val="0"/>
+              </a:ext>
+            </a:extLst>
+          </a:blip>
+          <a:srcRect/>
+          <a:stretch>
+            <a:fillRect/>
+          </a:stretch>
+        </p:blipFill>
+        <p:spPr bwMode="auto">
+          <a:xfrm>
+            <a:off x="745435" y="929308"/>
+            <a:ext cx="3677478" cy="1838739"/>
+          </a:xfrm>
+          <a:prstGeom prst="rect">
+            <a:avLst/>
+          </a:prstGeom>
+          <a:noFill/>
+          <a:extLst>
+            <a:ext uri="{909E8E84-426E-40DD-AFC4-6F175D3DCCD1}">
+              <a14:hiddenFill xmlns:a14="http://schemas.microsoft.com/office/drawing/2010/main">
+                <a:solidFill>
+                  <a:srgbClr val="FFFFFF"/>
+                </a:solidFill>
+              </a14:hiddenFill>
+            </a:ext>
+          </a:extLst>
+        </p:spPr>
+      </p:pic>
+    </p:spTree>
+    <p:extLst>
+      <p:ext uri="{BB962C8B-B14F-4D97-AF65-F5344CB8AC3E}">
+        <p14:creationId xmlns:p14="http://schemas.microsoft.com/office/powerpoint/2010/main" val="706159940"/>
+      </p:ext>
+    </p:extLst>
+  </p:cSld>
+  <p:clrMapOvr>
+    <a:masterClrMapping/>
+  </p:clrMapOvr>
+</p:sld>
+</file>
+
 <file path=ppt/theme/theme1.xml><?xml version="1.0" encoding="utf-8"?>
 <a:theme xmlns:a="http://schemas.openxmlformats.org/drawingml/2006/main" name="Tema do Office">
   <a:themeElements>

</xml_diff>